<commit_message>
updated wk2 workshop vids to zuyd mediasite
</commit_message>
<xml_diff>
--- a/docs/additional-materials/HRA Review.pptx
+++ b/docs/additional-materials/HRA Review.pptx
@@ -41509,42 +41509,26 @@
 </file>
 
 <file path=customXml/item2.xml><?xml version="1.0" encoding="utf-8"?>
-<ct:contentTypeSchema xmlns:ct="http://schemas.microsoft.com/office/2006/metadata/contentType" xmlns:ma="http://schemas.microsoft.com/office/2006/metadata/properties/metaAttributes" ct:_="" ma:_="" ma:contentTypeName="Document" ma:contentTypeID="0x01010079F111ED35F8CC479449609E8A0923A6" ma:contentTypeVersion="28" ma:contentTypeDescription="Create a new document." ma:contentTypeScope="" ma:versionID="60f5a4f2d2b0abadcf532d48ebf9cb71">
-  <xsd:schema xmlns:xsd="http://www.w3.org/2001/XMLSchema" xmlns:xs="http://www.w3.org/2001/XMLSchema" xmlns:p="http://schemas.microsoft.com/office/2006/metadata/properties" xmlns:ns1="http://schemas.microsoft.com/sharepoint/v3" xmlns:ns2="71af3243-3dd4-4a8d-8c0d-dd76da1f02a5" xmlns:ns3="16c05727-aa75-4e4a-9b5f-8a80a1165891" xmlns:ns4="230e9df3-be65-4c73-a93b-d1236ebd677e" targetNamespace="http://schemas.microsoft.com/office/2006/metadata/properties" ma:root="true" ma:fieldsID="7dd78129e6a1811f84807ad11c651531" ns1:_="" ns2:_="" ns3:_="" ns4:_="">
-    <xsd:import namespace="http://schemas.microsoft.com/sharepoint/v3"/>
-    <xsd:import namespace="71af3243-3dd4-4a8d-8c0d-dd76da1f02a5"/>
-    <xsd:import namespace="16c05727-aa75-4e4a-9b5f-8a80a1165891"/>
-    <xsd:import namespace="230e9df3-be65-4c73-a93b-d1236ebd677e"/>
+<ct:contentTypeSchema xmlns:ct="http://schemas.microsoft.com/office/2006/metadata/contentType" xmlns:ma="http://schemas.microsoft.com/office/2006/metadata/properties/metaAttributes" ct:_="" ma:_="" ma:contentTypeName="Document" ma:contentTypeID="0x0101004C9B46969FEA9B418B6ECF3C00C78A3F" ma:contentTypeVersion="12" ma:contentTypeDescription="Een nieuw document maken." ma:contentTypeScope="" ma:versionID="510e17e38c1fac53a09aa39c63d38ad8">
+  <xsd:schema xmlns:xsd="http://www.w3.org/2001/XMLSchema" xmlns:xs="http://www.w3.org/2001/XMLSchema" xmlns:p="http://schemas.microsoft.com/office/2006/metadata/properties" xmlns:ns2="52f235f7-1081-46ec-beea-0dbb270c3494" targetNamespace="http://schemas.microsoft.com/office/2006/metadata/properties" ma:root="true" ma:fieldsID="2678fc25c9056504f0cec2963dbb1c9a" ns2:_="">
+    <xsd:import namespace="52f235f7-1081-46ec-beea-0dbb270c3494"/>
     <xsd:element name="properties">
       <xsd:complexType>
         <xsd:sequence>
           <xsd:element name="documentManagement">
             <xsd:complexType>
               <xsd:all>
-                <xsd:element ref="ns2:Status" minOccurs="0"/>
-                <xsd:element ref="ns2:Image" minOccurs="0"/>
                 <xsd:element ref="ns2:MediaServiceMetadata" minOccurs="0"/>
                 <xsd:element ref="ns2:MediaServiceFastMetadata" minOccurs="0"/>
+                <xsd:element ref="ns2:MediaServiceSearchProperties" minOccurs="0"/>
+                <xsd:element ref="ns2:Additionalinformation" minOccurs="0"/>
+                <xsd:element ref="ns2:MediaServiceDateTaken" minOccurs="0"/>
+                <xsd:element ref="ns2:MediaServiceGenerationTime" minOccurs="0"/>
+                <xsd:element ref="ns2:MediaServiceEventHashCode" minOccurs="0"/>
+                <xsd:element ref="ns2:MediaLengthInSeconds" minOccurs="0"/>
+                <xsd:element ref="ns2:MediaServiceBillingMetadata" minOccurs="0"/>
+                <xsd:element ref="ns2:lcf76f155ced4ddcb4097134ff3c332f" minOccurs="0"/>
                 <xsd:element ref="ns2:MediaServiceOCR" minOccurs="0"/>
-                <xsd:element ref="ns2:MediaServiceAutoTags" minOccurs="0"/>
-                <xsd:element ref="ns2:MediaServiceEventHashCode" minOccurs="0"/>
-                <xsd:element ref="ns2:MediaServiceGenerationTime" minOccurs="0"/>
-                <xsd:element ref="ns3:SharedWithUsers" minOccurs="0"/>
-                <xsd:element ref="ns3:SharedWithDetails" minOccurs="0"/>
-                <xsd:element ref="ns2:MediaServiceAutoKeyPoints" minOccurs="0"/>
-                <xsd:element ref="ns2:MediaServiceKeyPoints" minOccurs="0"/>
-                <xsd:element ref="ns2:MediaServiceDateTaken" minOccurs="0"/>
-                <xsd:element ref="ns1:_ip_UnifiedCompliancePolicyProperties" minOccurs="0"/>
-                <xsd:element ref="ns1:_ip_UnifiedCompliancePolicyUIAction" minOccurs="0"/>
-                <xsd:element ref="ns4:TaxCatchAll" minOccurs="0"/>
-                <xsd:element ref="ns2:ImageTagsTaxHTField" minOccurs="0"/>
-                <xsd:element ref="ns2:MediaServiceLocation" minOccurs="0"/>
-                <xsd:element ref="ns2:MediaLengthInSeconds" minOccurs="0"/>
-                <xsd:element ref="ns2:Background" minOccurs="0"/>
-                <xsd:element ref="ns2:MediaServiceSearchProperties" minOccurs="0"/>
-                <xsd:element ref="ns2:MediaServiceDocTags" minOccurs="0"/>
-                <xsd:element ref="ns2:MediaServiceObjectDetectorVersions" minOccurs="0"/>
-                <xsd:element ref="ns2:MediaServiceSystemTags" minOccurs="0"/>
               </xsd:all>
             </xsd:complexType>
           </xsd:element>
@@ -41552,44 +41536,9 @@
       </xsd:complexType>
     </xsd:element>
   </xsd:schema>
-  <xsd:schema xmlns:xsd="http://www.w3.org/2001/XMLSchema" xmlns:xs="http://www.w3.org/2001/XMLSchema" xmlns:dms="http://schemas.microsoft.com/office/2006/documentManagement/types" xmlns:pc="http://schemas.microsoft.com/office/infopath/2007/PartnerControls" targetNamespace="http://schemas.microsoft.com/sharepoint/v3" elementFormDefault="qualified">
+  <xsd:schema xmlns:xsd="http://www.w3.org/2001/XMLSchema" xmlns:xs="http://www.w3.org/2001/XMLSchema" xmlns:dms="http://schemas.microsoft.com/office/2006/documentManagement/types" xmlns:pc="http://schemas.microsoft.com/office/infopath/2007/PartnerControls" targetNamespace="52f235f7-1081-46ec-beea-0dbb270c3494" elementFormDefault="qualified">
     <xsd:import namespace="http://schemas.microsoft.com/office/2006/documentManagement/types"/>
     <xsd:import namespace="http://schemas.microsoft.com/office/infopath/2007/PartnerControls"/>
-    <xsd:element name="_ip_UnifiedCompliancePolicyProperties" ma:index="20" nillable="true" ma:displayName="Unified Compliance Policy Properties" ma:hidden="true" ma:internalName="_ip_UnifiedCompliancePolicyProperties" ma:readOnly="false">
-      <xsd:simpleType>
-        <xsd:restriction base="dms:Note"/>
-      </xsd:simpleType>
-    </xsd:element>
-    <xsd:element name="_ip_UnifiedCompliancePolicyUIAction" ma:index="21" nillable="true" ma:displayName="Unified Compliance Policy UI Action" ma:hidden="true" ma:internalName="_ip_UnifiedCompliancePolicyUIAction" ma:readOnly="false">
-      <xsd:simpleType>
-        <xsd:restriction base="dms:Text"/>
-      </xsd:simpleType>
-    </xsd:element>
-  </xsd:schema>
-  <xsd:schema xmlns:xsd="http://www.w3.org/2001/XMLSchema" xmlns:xs="http://www.w3.org/2001/XMLSchema" xmlns:dms="http://schemas.microsoft.com/office/2006/documentManagement/types" xmlns:pc="http://schemas.microsoft.com/office/infopath/2007/PartnerControls" targetNamespace="71af3243-3dd4-4a8d-8c0d-dd76da1f02a5" elementFormDefault="qualified">
-    <xsd:import namespace="http://schemas.microsoft.com/office/2006/documentManagement/types"/>
-    <xsd:import namespace="http://schemas.microsoft.com/office/infopath/2007/PartnerControls"/>
-    <xsd:element name="Status" ma:index="2" nillable="true" ma:displayName="Status" ma:default="Not started" ma:format="Dropdown" ma:internalName="Status" ma:readOnly="false">
-      <xsd:simpleType>
-        <xsd:restriction base="dms:Choice">
-          <xsd:enumeration value="Not started"/>
-          <xsd:enumeration value="In Progress"/>
-          <xsd:enumeration value="Completed"/>
-        </xsd:restriction>
-      </xsd:simpleType>
-    </xsd:element>
-    <xsd:element name="Image" ma:index="3" nillable="true" ma:displayName="Image" ma:format="Image" ma:internalName="Image" ma:readOnly="false">
-      <xsd:complexType>
-        <xsd:complexContent>
-          <xsd:extension base="dms:URL">
-            <xsd:sequence>
-              <xsd:element name="Url" type="dms:ValidUrl" minOccurs="0" nillable="true"/>
-              <xsd:element name="Description" type="xsd:string" nillable="true"/>
-            </xsd:sequence>
-          </xsd:extension>
-        </xsd:complexContent>
-      </xsd:complexType>
-    </xsd:element>
     <xsd:element name="MediaServiceMetadata" ma:index="8" nillable="true" ma:displayName="MediaServiceMetadata" ma:hidden="true" ma:internalName="MediaServiceMetadata" ma:readOnly="true">
       <xsd:simpleType>
         <xsd:restriction base="dms:Note"/>
@@ -41600,17 +41549,19 @@
         <xsd:restriction base="dms:Note"/>
       </xsd:simpleType>
     </xsd:element>
-    <xsd:element name="MediaServiceOCR" ma:index="10" nillable="true" ma:displayName="MediaServiceOCR" ma:hidden="true" ma:internalName="MediaServiceOCR" ma:readOnly="true">
+    <xsd:element name="MediaServiceSearchProperties" ma:index="10" nillable="true" ma:displayName="MediaServiceSearchProperties" ma:hidden="true" ma:internalName="MediaServiceSearchProperties" ma:readOnly="true">
       <xsd:simpleType>
         <xsd:restriction base="dms:Note"/>
       </xsd:simpleType>
     </xsd:element>
-    <xsd:element name="MediaServiceAutoTags" ma:index="11" nillable="true" ma:displayName="MediaServiceAutoTags" ma:hidden="true" ma:internalName="MediaServiceAutoTags" ma:readOnly="true">
+    <xsd:element name="Additionalinformation" ma:index="11" nillable="true" ma:displayName="Additional information " ma:description="As an example, you can use this PPT to organise your first PBL meeting. Try to position the students as members of a management team, which frequently comes together; well prepared and dressed appropriately ;)" ma:format="Dropdown" ma:internalName="Additionalinformation">
       <xsd:simpleType>
-        <xsd:restriction base="dms:Text"/>
+        <xsd:restriction base="dms:Text">
+          <xsd:maxLength value="255"/>
+        </xsd:restriction>
       </xsd:simpleType>
     </xsd:element>
-    <xsd:element name="MediaServiceEventHashCode" ma:index="12" nillable="true" ma:displayName="MediaServiceEventHashCode" ma:hidden="true" ma:internalName="MediaServiceEventHashCode" ma:readOnly="true">
+    <xsd:element name="MediaServiceDateTaken" ma:index="12" nillable="true" ma:displayName="MediaServiceDateTaken" ma:hidden="true" ma:indexed="true" ma:internalName="MediaServiceDateTaken" ma:readOnly="true">
       <xsd:simpleType>
         <xsd:restriction base="dms:Text"/>
       </xsd:simpleType>
@@ -41620,105 +41571,34 @@
         <xsd:restriction base="dms:Text"/>
       </xsd:simpleType>
     </xsd:element>
-    <xsd:element name="MediaServiceAutoKeyPoints" ma:index="16" nillable="true" ma:displayName="MediaServiceAutoKeyPoints" ma:hidden="true" ma:internalName="MediaServiceAutoKeyPoints" ma:readOnly="true">
+    <xsd:element name="MediaServiceEventHashCode" ma:index="14" nillable="true" ma:displayName="MediaServiceEventHashCode" ma:hidden="true" ma:internalName="MediaServiceEventHashCode" ma:readOnly="true">
+      <xsd:simpleType>
+        <xsd:restriction base="dms:Text"/>
+      </xsd:simpleType>
+    </xsd:element>
+    <xsd:element name="MediaLengthInSeconds" ma:index="15" nillable="true" ma:displayName="MediaLengthInSeconds" ma:hidden="true" ma:internalName="MediaLengthInSeconds" ma:readOnly="true">
+      <xsd:simpleType>
+        <xsd:restriction base="dms:Unknown"/>
+      </xsd:simpleType>
+    </xsd:element>
+    <xsd:element name="MediaServiceBillingMetadata" ma:index="16" nillable="true" ma:displayName="MediaServiceBillingMetadata" ma:hidden="true" ma:internalName="MediaServiceBillingMetadata" ma:readOnly="true">
       <xsd:simpleType>
         <xsd:restriction base="dms:Note"/>
       </xsd:simpleType>
     </xsd:element>
-    <xsd:element name="MediaServiceKeyPoints" ma:index="17" nillable="true" ma:displayName="KeyPoints" ma:hidden="true" ma:internalName="MediaServiceKeyPoints" ma:readOnly="false">
-      <xsd:simpleType>
-        <xsd:restriction base="dms:Note"/>
-      </xsd:simpleType>
-    </xsd:element>
-    <xsd:element name="MediaServiceDateTaken" ma:index="18" nillable="true" ma:displayName="MediaServiceDateTaken" ma:hidden="true" ma:internalName="MediaServiceDateTaken" ma:readOnly="true">
-      <xsd:simpleType>
-        <xsd:restriction base="dms:Text"/>
-      </xsd:simpleType>
-    </xsd:element>
-    <xsd:element name="ImageTagsTaxHTField" ma:index="25" nillable="true" ma:taxonomy="true" ma:internalName="ImageTagsTaxHTField" ma:taxonomyFieldName="MediaServiceImageTags" ma:displayName="Image Tags" ma:readOnly="false" ma:fieldId="{5cf76f15-5ced-4ddc-b409-7134ff3c332f}" ma:taxonomyMulti="true" ma:sspId="e385fb40-52d4-4fae-9c5b-3e8ff8a5878e" ma:termSetId="09814cd3-568e-fe90-9814-8d621ff8fb84" ma:anchorId="fba54fb3-c3e1-fe81-a776-ca4b69148c4d" ma:open="true" ma:isKeyword="false">
+    <xsd:element name="lcf76f155ced4ddcb4097134ff3c332f" ma:index="18" nillable="true" ma:taxonomy="true" ma:internalName="lcf76f155ced4ddcb4097134ff3c332f" ma:taxonomyFieldName="MediaServiceImageTags" ma:displayName="Afbeeldingtags" ma:readOnly="false" ma:fieldId="{5cf76f15-5ced-4ddc-b409-7134ff3c332f}" ma:taxonomyMulti="true" ma:sspId="5bd69f14-2b9f-433c-9887-fccfa466e118" ma:termSetId="09814cd3-568e-fe90-9814-8d621ff8fb84" ma:anchorId="fba54fb3-c3e1-fe81-a776-ca4b69148c4d" ma:open="true" ma:isKeyword="false">
       <xsd:complexType>
         <xsd:sequence>
           <xsd:element ref="pc:Terms" minOccurs="0" maxOccurs="1"/>
         </xsd:sequence>
       </xsd:complexType>
     </xsd:element>
-    <xsd:element name="MediaServiceLocation" ma:index="26" nillable="true" ma:displayName="Location" ma:hidden="true" ma:internalName="MediaServiceLocation" ma:readOnly="true">
+    <xsd:element name="MediaServiceOCR" ma:index="19" nillable="true" ma:displayName="Extracted Text" ma:internalName="MediaServiceOCR" ma:readOnly="true">
       <xsd:simpleType>
-        <xsd:restriction base="dms:Text"/>
+        <xsd:restriction base="dms:Note">
+          <xsd:maxLength value="255"/>
+        </xsd:restriction>
       </xsd:simpleType>
-    </xsd:element>
-    <xsd:element name="MediaLengthInSeconds" ma:index="27" nillable="true" ma:displayName="MediaLengthInSeconds" ma:hidden="true" ma:internalName="MediaLengthInSeconds" ma:readOnly="true">
-      <xsd:simpleType>
-        <xsd:restriction base="dms:Unknown"/>
-      </xsd:simpleType>
-    </xsd:element>
-    <xsd:element name="Background" ma:index="28" nillable="true" ma:displayName="Background" ma:default="0" ma:format="Dropdown" ma:internalName="Background">
-      <xsd:simpleType>
-        <xsd:restriction base="dms:Boolean"/>
-      </xsd:simpleType>
-    </xsd:element>
-    <xsd:element name="MediaServiceSearchProperties" ma:index="29" nillable="true" ma:displayName="MediaServiceSearchProperties" ma:hidden="true" ma:internalName="MediaServiceSearchProperties" ma:readOnly="true">
-      <xsd:simpleType>
-        <xsd:restriction base="dms:Note"/>
-      </xsd:simpleType>
-    </xsd:element>
-    <xsd:element name="MediaServiceDocTags" ma:index="30" nillable="true" ma:displayName="MediaServiceDocTags" ma:hidden="true" ma:internalName="MediaServiceDocTags" ma:readOnly="true">
-      <xsd:simpleType>
-        <xsd:restriction base="dms:Note"/>
-      </xsd:simpleType>
-    </xsd:element>
-    <xsd:element name="MediaServiceObjectDetectorVersions" ma:index="31" nillable="true" ma:displayName="MediaServiceObjectDetectorVersions" ma:description="" ma:hidden="true" ma:indexed="true" ma:internalName="MediaServiceObjectDetectorVersions" ma:readOnly="true">
-      <xsd:simpleType>
-        <xsd:restriction base="dms:Text"/>
-      </xsd:simpleType>
-    </xsd:element>
-    <xsd:element name="MediaServiceSystemTags" ma:index="32" nillable="true" ma:displayName="MediaServiceSystemTags" ma:hidden="true" ma:internalName="MediaServiceSystemTags" ma:readOnly="true">
-      <xsd:simpleType>
-        <xsd:restriction base="dms:Note"/>
-      </xsd:simpleType>
-    </xsd:element>
-  </xsd:schema>
-  <xsd:schema xmlns:xsd="http://www.w3.org/2001/XMLSchema" xmlns:xs="http://www.w3.org/2001/XMLSchema" xmlns:dms="http://schemas.microsoft.com/office/2006/documentManagement/types" xmlns:pc="http://schemas.microsoft.com/office/infopath/2007/PartnerControls" targetNamespace="16c05727-aa75-4e4a-9b5f-8a80a1165891" elementFormDefault="qualified">
-    <xsd:import namespace="http://schemas.microsoft.com/office/2006/documentManagement/types"/>
-    <xsd:import namespace="http://schemas.microsoft.com/office/infopath/2007/PartnerControls"/>
-    <xsd:element name="SharedWithUsers" ma:index="14" nillable="true" ma:displayName="Shared With" ma:hidden="true" ma:internalName="SharedWithUsers" ma:readOnly="true">
-      <xsd:complexType>
-        <xsd:complexContent>
-          <xsd:extension base="dms:UserMulti">
-            <xsd:sequence>
-              <xsd:element name="UserInfo" minOccurs="0" maxOccurs="unbounded">
-                <xsd:complexType>
-                  <xsd:sequence>
-                    <xsd:element name="DisplayName" type="xsd:string" minOccurs="0"/>
-                    <xsd:element name="AccountId" type="dms:UserId" minOccurs="0" nillable="true"/>
-                    <xsd:element name="AccountType" type="xsd:string" minOccurs="0"/>
-                  </xsd:sequence>
-                </xsd:complexType>
-              </xsd:element>
-            </xsd:sequence>
-          </xsd:extension>
-        </xsd:complexContent>
-      </xsd:complexType>
-    </xsd:element>
-    <xsd:element name="SharedWithDetails" ma:index="15" nillable="true" ma:displayName="Shared With Details" ma:hidden="true" ma:internalName="SharedWithDetails" ma:readOnly="true">
-      <xsd:simpleType>
-        <xsd:restriction base="dms:Note"/>
-      </xsd:simpleType>
-    </xsd:element>
-  </xsd:schema>
-  <xsd:schema xmlns:xsd="http://www.w3.org/2001/XMLSchema" xmlns:xs="http://www.w3.org/2001/XMLSchema" xmlns:dms="http://schemas.microsoft.com/office/2006/documentManagement/types" xmlns:pc="http://schemas.microsoft.com/office/infopath/2007/PartnerControls" targetNamespace="230e9df3-be65-4c73-a93b-d1236ebd677e" elementFormDefault="qualified">
-    <xsd:import namespace="http://schemas.microsoft.com/office/2006/documentManagement/types"/>
-    <xsd:import namespace="http://schemas.microsoft.com/office/infopath/2007/PartnerControls"/>
-    <xsd:element name="TaxCatchAll" ma:index="23" nillable="true" ma:displayName="Taxonomy Catch All Column" ma:hidden="true" ma:list="{3f6bfcbc-3db3-4ae6-bd76-326f0798ad28}" ma:internalName="TaxCatchAll" ma:readOnly="false" ma:showField="CatchAllData" ma:web="16c05727-aa75-4e4a-9b5f-8a80a1165891">
-      <xsd:complexType>
-        <xsd:complexContent>
-          <xsd:extension base="dms:MultiChoiceLookup">
-            <xsd:sequence>
-              <xsd:element name="Value" type="dms:Lookup" maxOccurs="unbounded" minOccurs="0" nillable="true"/>
-            </xsd:sequence>
-          </xsd:extension>
-        </xsd:complexContent>
-      </xsd:complexType>
     </xsd:element>
   </xsd:schema>
   <xsd:schema xmlns="http://schemas.openxmlformats.org/package/2006/metadata/core-properties" xmlns:xsd="http://www.w3.org/2001/XMLSchema" xmlns:xsi="http://www.w3.org/2001/XMLSchema-instance" xmlns:dc="http://purl.org/dc/elements/1.1/" xmlns:dcterms="http://purl.org/dc/terms/" xmlns:odoc="http://schemas.microsoft.com/internal/obd" targetNamespace="http://schemas.openxmlformats.org/package/2006/metadata/core-properties" elementFormDefault="qualified" attributeFormDefault="unqualified" blockDefault="#all">
@@ -41730,8 +41610,8 @@
         <xsd:element ref="dc:creator" minOccurs="0" maxOccurs="1"/>
         <xsd:element ref="dcterms:created" minOccurs="0" maxOccurs="1"/>
         <xsd:element ref="dc:identifier" minOccurs="0" maxOccurs="1"/>
-        <xsd:element name="contentType" minOccurs="0" maxOccurs="1" type="xsd:string" ma:displayName="Content Type"/>
-        <xsd:element ref="dc:title" minOccurs="0" maxOccurs="1" ma:index="1" ma:displayName="Title"/>
+        <xsd:element name="contentType" minOccurs="0" maxOccurs="1" type="xsd:string" ma:index="0" ma:displayName="Inhoudstype"/>
+        <xsd:element ref="dc:title" minOccurs="0" maxOccurs="1" ma:index="4" ma:displayName="Titel"/>
         <xsd:element ref="dc:subject" minOccurs="0" maxOccurs="1"/>
         <xsd:element ref="dc:description" minOccurs="0" maxOccurs="1"/>
         <xsd:element name="keywords" minOccurs="0" maxOccurs="1" type="xsd:string"/>
@@ -41823,19 +41703,10 @@
 <file path=customXml/item3.xml><?xml version="1.0" encoding="utf-8"?>
 <p:properties xmlns:p="http://schemas.microsoft.com/office/2006/metadata/properties" xmlns:xsi="http://www.w3.org/2001/XMLSchema-instance" xmlns:pc="http://schemas.microsoft.com/office/infopath/2007/PartnerControls">
   <documentManagement>
-    <_ip_UnifiedCompliancePolicyUIAction xmlns="http://schemas.microsoft.com/sharepoint/v3" xsi:nil="true"/>
-    <Image xmlns="71af3243-3dd4-4a8d-8c0d-dd76da1f02a5">
-      <Url xsi:nil="true"/>
-      <Description xsi:nil="true"/>
-    </Image>
-    <Status xmlns="71af3243-3dd4-4a8d-8c0d-dd76da1f02a5">Not started</Status>
-    <Background xmlns="71af3243-3dd4-4a8d-8c0d-dd76da1f02a5">false</Background>
-    <_ip_UnifiedCompliancePolicyProperties xmlns="http://schemas.microsoft.com/sharepoint/v3" xsi:nil="true"/>
-    <ImageTagsTaxHTField xmlns="71af3243-3dd4-4a8d-8c0d-dd76da1f02a5">
+    <lcf76f155ced4ddcb4097134ff3c332f xmlns="52f235f7-1081-46ec-beea-0dbb270c3494">
       <Terms xmlns="http://schemas.microsoft.com/office/infopath/2007/PartnerControls"/>
-    </ImageTagsTaxHTField>
-    <TaxCatchAll xmlns="230e9df3-be65-4c73-a93b-d1236ebd677e" xsi:nil="true"/>
-    <MediaServiceKeyPoints xmlns="71af3243-3dd4-4a8d-8c0d-dd76da1f02a5" xsi:nil="true"/>
+    </lcf76f155ced4ddcb4097134ff3c332f>
+    <Additionalinformation xmlns="52f235f7-1081-46ec-beea-0dbb270c3494" xsi:nil="true"/>
   </documentManagement>
 </p:properties>
 </file>
@@ -41849,24 +41720,7 @@
 </file>
 
 <file path=customXml/itemProps2.xml><?xml version="1.0" encoding="utf-8"?>
-<ds:datastoreItem xmlns:ds="http://schemas.openxmlformats.org/officeDocument/2006/customXml" ds:itemID="{5EDE3176-A15D-46A3-BDDB-64A0D7363224}">
-  <ds:schemaRefs>
-    <ds:schemaRef ds:uri="http://schemas.microsoft.com/office/2006/metadata/contentType"/>
-    <ds:schemaRef ds:uri="http://schemas.microsoft.com/office/2006/metadata/properties/metaAttributes"/>
-    <ds:schemaRef ds:uri="http://www.w3.org/2001/XMLSchema"/>
-    <ds:schemaRef ds:uri="http://schemas.microsoft.com/office/2006/metadata/properties"/>
-    <ds:schemaRef ds:uri="http://schemas.microsoft.com/sharepoint/v3"/>
-    <ds:schemaRef ds:uri="71af3243-3dd4-4a8d-8c0d-dd76da1f02a5"/>
-    <ds:schemaRef ds:uri="16c05727-aa75-4e4a-9b5f-8a80a1165891"/>
-    <ds:schemaRef ds:uri="230e9df3-be65-4c73-a93b-d1236ebd677e"/>
-    <ds:schemaRef ds:uri="http://schemas.microsoft.com/office/2006/documentManagement/types"/>
-    <ds:schemaRef ds:uri="http://schemas.microsoft.com/office/infopath/2007/PartnerControls"/>
-    <ds:schemaRef ds:uri="http://schemas.openxmlformats.org/package/2006/metadata/core-properties"/>
-    <ds:schemaRef ds:uri="http://purl.org/dc/elements/1.1/"/>
-    <ds:schemaRef ds:uri="http://purl.org/dc/terms/"/>
-    <ds:schemaRef ds:uri="http://schemas.microsoft.com/internal/obd"/>
-  </ds:schemaRefs>
-</ds:datastoreItem>
+<ds:datastoreItem xmlns:ds="http://schemas.openxmlformats.org/officeDocument/2006/customXml" ds:itemID="{3FDD2DDF-6D27-44E1-8982-308DDED289E7}"/>
 </file>
 
 <file path=customXml/itemProps3.xml><?xml version="1.0" encoding="utf-8"?>

</xml_diff>